<commit_message>
Revised Docs, added Comments, Formatted Song Info Display
</commit_message>
<xml_diff>
--- a/Documentation/webServiceRadioStationPresentation_TechTycoons.pptx
+++ b/Documentation/webServiceRadioStationPresentation_TechTycoons.pptx
@@ -206,7 +206,7 @@
           <a:p>
             <a:fld id="{A5D84766-5807-42C7-B9A1-4F935B7B0E82}" type="datetimeFigureOut">
               <a:rPr lang="en-US" smtClean="0"/>
-              <a:t>12/7/2020</a:t>
+              <a:t>12/8/2020</a:t>
             </a:fld>
             <a:endParaRPr lang="en-US"/>
           </a:p>
@@ -1566,7 +1566,7 @@
           <a:p>
             <a:fld id="{D5370A7B-2D26-46EF-B3CD-3AF55D884BEB}" type="datetimeFigureOut">
               <a:rPr lang="en-US" smtClean="0"/>
-              <a:t>12/7/2020</a:t>
+              <a:t>12/8/2020</a:t>
             </a:fld>
             <a:endParaRPr lang="en-US"/>
           </a:p>
@@ -1764,7 +1764,7 @@
           <a:p>
             <a:fld id="{D5370A7B-2D26-46EF-B3CD-3AF55D884BEB}" type="datetimeFigureOut">
               <a:rPr lang="en-US" smtClean="0"/>
-              <a:t>12/7/2020</a:t>
+              <a:t>12/8/2020</a:t>
             </a:fld>
             <a:endParaRPr lang="en-US"/>
           </a:p>
@@ -1972,7 +1972,7 @@
           <a:p>
             <a:fld id="{D5370A7B-2D26-46EF-B3CD-3AF55D884BEB}" type="datetimeFigureOut">
               <a:rPr lang="en-US" smtClean="0"/>
-              <a:t>12/7/2020</a:t>
+              <a:t>12/8/2020</a:t>
             </a:fld>
             <a:endParaRPr lang="en-US"/>
           </a:p>
@@ -4429,7 +4429,7 @@
           <a:p>
             <a:fld id="{D5370A7B-2D26-46EF-B3CD-3AF55D884BEB}" type="datetimeFigureOut">
               <a:rPr lang="en-US" smtClean="0"/>
-              <a:t>12/7/2020</a:t>
+              <a:t>12/8/2020</a:t>
             </a:fld>
             <a:endParaRPr lang="en-US"/>
           </a:p>
@@ -4704,7 +4704,7 @@
           <a:p>
             <a:fld id="{D5370A7B-2D26-46EF-B3CD-3AF55D884BEB}" type="datetimeFigureOut">
               <a:rPr lang="en-US" smtClean="0"/>
-              <a:t>12/7/2020</a:t>
+              <a:t>12/8/2020</a:t>
             </a:fld>
             <a:endParaRPr lang="en-US"/>
           </a:p>
@@ -4969,7 +4969,7 @@
           <a:p>
             <a:fld id="{D5370A7B-2D26-46EF-B3CD-3AF55D884BEB}" type="datetimeFigureOut">
               <a:rPr lang="en-US" smtClean="0"/>
-              <a:t>12/7/2020</a:t>
+              <a:t>12/8/2020</a:t>
             </a:fld>
             <a:endParaRPr lang="en-US"/>
           </a:p>
@@ -5381,7 +5381,7 @@
           <a:p>
             <a:fld id="{D5370A7B-2D26-46EF-B3CD-3AF55D884BEB}" type="datetimeFigureOut">
               <a:rPr lang="en-US" smtClean="0"/>
-              <a:t>12/7/2020</a:t>
+              <a:t>12/8/2020</a:t>
             </a:fld>
             <a:endParaRPr lang="en-US"/>
           </a:p>
@@ -5522,7 +5522,7 @@
           <a:p>
             <a:fld id="{D5370A7B-2D26-46EF-B3CD-3AF55D884BEB}" type="datetimeFigureOut">
               <a:rPr lang="en-US" smtClean="0"/>
-              <a:t>12/7/2020</a:t>
+              <a:t>12/8/2020</a:t>
             </a:fld>
             <a:endParaRPr lang="en-US"/>
           </a:p>
@@ -5635,7 +5635,7 @@
           <a:p>
             <a:fld id="{D5370A7B-2D26-46EF-B3CD-3AF55D884BEB}" type="datetimeFigureOut">
               <a:rPr lang="en-US" smtClean="0"/>
-              <a:t>12/7/2020</a:t>
+              <a:t>12/8/2020</a:t>
             </a:fld>
             <a:endParaRPr lang="en-US"/>
           </a:p>
@@ -5946,7 +5946,7 @@
           <a:p>
             <a:fld id="{D5370A7B-2D26-46EF-B3CD-3AF55D884BEB}" type="datetimeFigureOut">
               <a:rPr lang="en-US" smtClean="0"/>
-              <a:t>12/7/2020</a:t>
+              <a:t>12/8/2020</a:t>
             </a:fld>
             <a:endParaRPr lang="en-US"/>
           </a:p>
@@ -6234,7 +6234,7 @@
           <a:p>
             <a:fld id="{D5370A7B-2D26-46EF-B3CD-3AF55D884BEB}" type="datetimeFigureOut">
               <a:rPr lang="en-US" smtClean="0"/>
-              <a:t>12/7/2020</a:t>
+              <a:t>12/8/2020</a:t>
             </a:fld>
             <a:endParaRPr lang="en-US"/>
           </a:p>
@@ -6475,7 +6475,7 @@
           <a:p>
             <a:fld id="{D5370A7B-2D26-46EF-B3CD-3AF55D884BEB}" type="datetimeFigureOut">
               <a:rPr lang="en-US" smtClean="0"/>
-              <a:t>12/7/2020</a:t>
+              <a:t>12/8/2020</a:t>
             </a:fld>
             <a:endParaRPr lang="en-US"/>
           </a:p>
@@ -20932,6 +20932,42 @@
           </a:ln>
         </p:spPr>
       </p:pic>
+      <p:pic>
+        <p:nvPicPr>
+          <p:cNvPr id="3" name="Picture 2" descr="Graphical user interface, application, Teams&#10;&#10;Description automatically generated">
+            <a:extLst>
+              <a:ext uri="{FF2B5EF4-FFF2-40B4-BE49-F238E27FC236}">
+                <a16:creationId xmlns:a16="http://schemas.microsoft.com/office/drawing/2014/main" id="{1193AB06-19D7-4214-BC11-EAE2E33347D7}"/>
+              </a:ext>
+            </a:extLst>
+          </p:cNvPr>
+          <p:cNvPicPr>
+            <a:picLocks noChangeAspect="1"/>
+          </p:cNvPicPr>
+          <p:nvPr/>
+        </p:nvPicPr>
+        <p:blipFill>
+          <a:blip r:embed="rId4">
+            <a:extLst>
+              <a:ext uri="{28A0092B-C50C-407E-A947-70E740481C1C}">
+                <a14:useLocalDpi xmlns:a14="http://schemas.microsoft.com/office/drawing/2010/main" val="0"/>
+              </a:ext>
+            </a:extLst>
+          </a:blip>
+          <a:stretch>
+            <a:fillRect/>
+          </a:stretch>
+        </p:blipFill>
+        <p:spPr>
+          <a:xfrm>
+            <a:off x="5766789" y="1608609"/>
+            <a:ext cx="5345632" cy="3593220"/>
+          </a:xfrm>
+          <a:prstGeom prst="rect">
+            <a:avLst/>
+          </a:prstGeom>
+        </p:spPr>
+      </p:pic>
     </p:spTree>
   </p:cSld>
   <p:clrMapOvr>

</xml_diff>